<commit_message>
First Sketch of Map
Using Mapbox and NOAA dataset, generate a simple map plotting each event on a global scale.
</commit_message>
<xml_diff>
--- a/2.mapping-quantities/students/pm/christian/process/DVIA _A2_Concept sketch.pptx
+++ b/2.mapping-quantities/students/pm/christian/process/DVIA _A2_Concept sketch.pptx
@@ -1863,10 +1863,9 @@
               <a:buChar char="-"/>
             </a:pPr>
             <a:r>
-              <a:rPr lang="en-US" baseline="0" smtClean="0"/>
+              <a:rPr lang="en-US" baseline="0" dirty="0" smtClean="0"/>
               <a:t>Minimize </a:t>
             </a:r>
-            <a:endParaRPr lang="en-US" baseline="0" dirty="0" smtClean="0"/>
           </a:p>
           <a:p>
             <a:endParaRPr lang="en-US" baseline="0" dirty="0" smtClean="0"/>
@@ -47138,6 +47137,54 @@
           </p:txBody>
         </p:sp>
       </p:grpSp>
+      <p:sp>
+        <p:nvSpPr>
+          <p:cNvPr id="3" name="TextBox 2"/>
+          <p:cNvSpPr txBox="1"/>
+          <p:nvPr/>
+        </p:nvSpPr>
+        <p:spPr>
+          <a:xfrm>
+            <a:off x="-1531347" y="3538167"/>
+            <a:ext cx="2081275" cy="646331"/>
+          </a:xfrm>
+          <a:prstGeom prst="rect">
+            <a:avLst/>
+          </a:prstGeom>
+          <a:noFill/>
+        </p:spPr>
+        <p:txBody>
+          <a:bodyPr wrap="none" rtlCol="0">
+            <a:spAutoFit/>
+          </a:bodyPr>
+          <a:lstStyle/>
+          <a:p>
+            <a:r>
+              <a:rPr lang="en-US" dirty="0" smtClean="0"/>
+              <a:t>Try a </a:t>
+            </a:r>
+            <a:r>
+              <a:rPr lang="en-US" dirty="0" err="1" smtClean="0"/>
+              <a:t>gantt</a:t>
+            </a:r>
+            <a:r>
+              <a:rPr lang="en-US" dirty="0" smtClean="0"/>
+              <a:t> chart like</a:t>
+            </a:r>
+          </a:p>
+          <a:p>
+            <a:r>
+              <a:rPr lang="en-US" dirty="0" smtClean="0"/>
+              <a:t> </a:t>
+            </a:r>
+            <a:r>
+              <a:rPr lang="en-US" dirty="0" err="1" smtClean="0"/>
+              <a:t>appraocha</a:t>
+            </a:r>
+            <a:endParaRPr lang="en-US" dirty="0"/>
+          </a:p>
+        </p:txBody>
+      </p:sp>
     </p:spTree>
     <p:extLst>
       <p:ext uri="{BB962C8B-B14F-4D97-AF65-F5344CB8AC3E}">

</xml_diff>